<commit_message>
neues uml diagramm in super geil
</commit_message>
<xml_diff>
--- a/src/resources/Hybride systeme_Jörn_seine_Teile.pptx
+++ b/src/resources/Hybride systeme_Jörn_seine_Teile.pptx
@@ -4360,7 +4360,7 @@
           <a:noFill/>
           <a:extLst>
             <a:ext uri="{909E8E84-426E-40dd-AFC4-6F175D3DCCD1}">
-              <a14:hiddenFill xmlns:a14="http://schemas.microsoft.com/office/drawing/2010/main" xmlns="">
+              <a14:hiddenFill xmlns="" xmlns:a14="http://schemas.microsoft.com/office/drawing/2010/main">
                 <a:solidFill>
                   <a:srgbClr val="FFFFFF"/>
                 </a:solidFill>
@@ -4419,7 +4419,7 @@
             </a:ln>
             <a:extLst>
               <a:ext uri="{91240B29-F687-4f45-9708-019B960494DF}">
-                <a14:hiddenLine xmlns:a14="http://schemas.microsoft.com/office/drawing/2010/main" xmlns="" w="9525">
+                <a14:hiddenLine xmlns="" xmlns:a14="http://schemas.microsoft.com/office/drawing/2010/main" w="9525">
                   <a:solidFill>
                     <a:srgbClr val="000000"/>
                   </a:solidFill>
@@ -4509,7 +4509,7 @@
             </a:ln>
             <a:extLst>
               <a:ext uri="{91240B29-F687-4f45-9708-019B960494DF}">
-                <a14:hiddenLine xmlns:a14="http://schemas.microsoft.com/office/drawing/2010/main" xmlns="" w="9525">
+                <a14:hiddenLine xmlns="" xmlns:a14="http://schemas.microsoft.com/office/drawing/2010/main" w="9525">
                   <a:solidFill>
                     <a:srgbClr val="000000"/>
                   </a:solidFill>
@@ -4599,7 +4599,7 @@
             </a:ln>
             <a:extLst>
               <a:ext uri="{91240B29-F687-4f45-9708-019B960494DF}">
-                <a14:hiddenLine xmlns:a14="http://schemas.microsoft.com/office/drawing/2010/main" xmlns="" w="9525">
+                <a14:hiddenLine xmlns="" xmlns:a14="http://schemas.microsoft.com/office/drawing/2010/main" w="9525">
                   <a:solidFill>
                     <a:srgbClr val="000000"/>
                   </a:solidFill>
@@ -4633,7 +4633,7 @@
             </a:ln>
             <a:extLst>
               <a:ext uri="{91240B29-F687-4f45-9708-019B960494DF}">
-                <a14:hiddenLine xmlns:a14="http://schemas.microsoft.com/office/drawing/2010/main" xmlns="" w="9525">
+                <a14:hiddenLine xmlns="" xmlns:a14="http://schemas.microsoft.com/office/drawing/2010/main" w="9525">
                   <a:solidFill>
                     <a:srgbClr val="000000"/>
                   </a:solidFill>
@@ -4723,7 +4723,7 @@
             </a:ln>
             <a:extLst>
               <a:ext uri="{91240B29-F687-4f45-9708-019B960494DF}">
-                <a14:hiddenLine xmlns:a14="http://schemas.microsoft.com/office/drawing/2010/main" xmlns="" w="9525">
+                <a14:hiddenLine xmlns="" xmlns:a14="http://schemas.microsoft.com/office/drawing/2010/main" w="9525">
                   <a:solidFill>
                     <a:srgbClr val="000000"/>
                   </a:solidFill>
@@ -4785,7 +4785,7 @@
             </a:ln>
             <a:extLst>
               <a:ext uri="{91240B29-F687-4f45-9708-019B960494DF}">
-                <a14:hiddenLine xmlns:a14="http://schemas.microsoft.com/office/drawing/2010/main" xmlns="" w="9525">
+                <a14:hiddenLine xmlns="" xmlns:a14="http://schemas.microsoft.com/office/drawing/2010/main" w="9525">
                   <a:solidFill>
                     <a:srgbClr val="000000"/>
                   </a:solidFill>
@@ -4847,7 +4847,7 @@
             </a:ln>
             <a:extLst>
               <a:ext uri="{91240B29-F687-4f45-9708-019B960494DF}">
-                <a14:hiddenLine xmlns:a14="http://schemas.microsoft.com/office/drawing/2010/main" xmlns="" w="9525">
+                <a14:hiddenLine xmlns="" xmlns:a14="http://schemas.microsoft.com/office/drawing/2010/main" w="9525">
                   <a:solidFill>
                     <a:srgbClr val="000000"/>
                   </a:solidFill>
@@ -4937,7 +4937,7 @@
             </a:ln>
             <a:extLst>
               <a:ext uri="{91240B29-F687-4f45-9708-019B960494DF}">
-                <a14:hiddenLine xmlns:a14="http://schemas.microsoft.com/office/drawing/2010/main" xmlns="" w="9525">
+                <a14:hiddenLine xmlns="" xmlns:a14="http://schemas.microsoft.com/office/drawing/2010/main" w="9525">
                   <a:solidFill>
                     <a:srgbClr val="000000"/>
                   </a:solidFill>
@@ -4999,7 +4999,7 @@
             </a:ln>
             <a:extLst>
               <a:ext uri="{91240B29-F687-4f45-9708-019B960494DF}">
-                <a14:hiddenLine xmlns:a14="http://schemas.microsoft.com/office/drawing/2010/main" xmlns="" w="9525">
+                <a14:hiddenLine xmlns="" xmlns:a14="http://schemas.microsoft.com/office/drawing/2010/main" w="9525">
                   <a:solidFill>
                     <a:srgbClr val="000000"/>
                   </a:solidFill>
@@ -5061,7 +5061,7 @@
             </a:ln>
             <a:extLst>
               <a:ext uri="{91240B29-F687-4f45-9708-019B960494DF}">
-                <a14:hiddenLine xmlns:a14="http://schemas.microsoft.com/office/drawing/2010/main" xmlns="" w="9525">
+                <a14:hiddenLine xmlns="" xmlns:a14="http://schemas.microsoft.com/office/drawing/2010/main" w="9525">
                   <a:solidFill>
                     <a:srgbClr val="000000"/>
                   </a:solidFill>
@@ -5151,7 +5151,7 @@
             </a:ln>
             <a:extLst>
               <a:ext uri="{91240B29-F687-4f45-9708-019B960494DF}">
-                <a14:hiddenLine xmlns:a14="http://schemas.microsoft.com/office/drawing/2010/main" xmlns="" w="9525">
+                <a14:hiddenLine xmlns="" xmlns:a14="http://schemas.microsoft.com/office/drawing/2010/main" w="9525">
                   <a:solidFill>
                     <a:srgbClr val="000000"/>
                   </a:solidFill>
@@ -5241,7 +5241,7 @@
             </a:ln>
             <a:extLst>
               <a:ext uri="{91240B29-F687-4f45-9708-019B960494DF}">
-                <a14:hiddenLine xmlns:a14="http://schemas.microsoft.com/office/drawing/2010/main" xmlns="" w="9525">
+                <a14:hiddenLine xmlns="" xmlns:a14="http://schemas.microsoft.com/office/drawing/2010/main" w="9525">
                   <a:solidFill>
                     <a:srgbClr val="000000"/>
                   </a:solidFill>
@@ -5303,7 +5303,7 @@
             </a:ln>
             <a:extLst>
               <a:ext uri="{91240B29-F687-4f45-9708-019B960494DF}">
-                <a14:hiddenLine xmlns:a14="http://schemas.microsoft.com/office/drawing/2010/main" xmlns="" w="9525">
+                <a14:hiddenLine xmlns="" xmlns:a14="http://schemas.microsoft.com/office/drawing/2010/main" w="9525">
                   <a:solidFill>
                     <a:srgbClr val="000000"/>
                   </a:solidFill>
@@ -5413,7 +5413,7 @@
             </a:ln>
             <a:extLst>
               <a:ext uri="{91240B29-F687-4f45-9708-019B960494DF}">
-                <a14:hiddenLine xmlns:a14="http://schemas.microsoft.com/office/drawing/2010/main" xmlns="" w="9525">
+                <a14:hiddenLine xmlns="" xmlns:a14="http://schemas.microsoft.com/office/drawing/2010/main" w="9525">
                   <a:solidFill>
                     <a:srgbClr val="000000"/>
                   </a:solidFill>
@@ -5475,7 +5475,7 @@
             </a:ln>
             <a:extLst>
               <a:ext uri="{91240B29-F687-4f45-9708-019B960494DF}">
-                <a14:hiddenLine xmlns:a14="http://schemas.microsoft.com/office/drawing/2010/main" xmlns="" w="9525">
+                <a14:hiddenLine xmlns="" xmlns:a14="http://schemas.microsoft.com/office/drawing/2010/main" w="9525">
                   <a:solidFill>
                     <a:srgbClr val="000000"/>
                   </a:solidFill>
@@ -5565,7 +5565,7 @@
             </a:ln>
             <a:extLst>
               <a:ext uri="{91240B29-F687-4f45-9708-019B960494DF}">
-                <a14:hiddenLine xmlns:a14="http://schemas.microsoft.com/office/drawing/2010/main" xmlns="" w="9525">
+                <a14:hiddenLine xmlns="" xmlns:a14="http://schemas.microsoft.com/office/drawing/2010/main" w="9525">
                   <a:solidFill>
                     <a:srgbClr val="000000"/>
                   </a:solidFill>
@@ -5655,7 +5655,7 @@
             </a:ln>
             <a:extLst>
               <a:ext uri="{91240B29-F687-4f45-9708-019B960494DF}">
-                <a14:hiddenLine xmlns:a14="http://schemas.microsoft.com/office/drawing/2010/main" xmlns="" w="9525">
+                <a14:hiddenLine xmlns="" xmlns:a14="http://schemas.microsoft.com/office/drawing/2010/main" w="9525">
                   <a:solidFill>
                     <a:srgbClr val="000000"/>
                   </a:solidFill>
@@ -5717,7 +5717,7 @@
             </a:ln>
             <a:extLst>
               <a:ext uri="{91240B29-F687-4f45-9708-019B960494DF}">
-                <a14:hiddenLine xmlns:a14="http://schemas.microsoft.com/office/drawing/2010/main" xmlns="" w="9525">
+                <a14:hiddenLine xmlns="" xmlns:a14="http://schemas.microsoft.com/office/drawing/2010/main" w="9525">
                   <a:solidFill>
                     <a:srgbClr val="000000"/>
                   </a:solidFill>
@@ -5807,7 +5807,7 @@
             </a:ln>
             <a:extLst>
               <a:ext uri="{91240B29-F687-4f45-9708-019B960494DF}">
-                <a14:hiddenLine xmlns:a14="http://schemas.microsoft.com/office/drawing/2010/main" xmlns="" w="9525">
+                <a14:hiddenLine xmlns="" xmlns:a14="http://schemas.microsoft.com/office/drawing/2010/main" w="9525">
                   <a:solidFill>
                     <a:srgbClr val="000000"/>
                   </a:solidFill>
@@ -5897,7 +5897,7 @@
             </a:ln>
             <a:extLst>
               <a:ext uri="{91240B29-F687-4f45-9708-019B960494DF}">
-                <a14:hiddenLine xmlns:a14="http://schemas.microsoft.com/office/drawing/2010/main" xmlns="" w="9525">
+                <a14:hiddenLine xmlns="" xmlns:a14="http://schemas.microsoft.com/office/drawing/2010/main" w="9525">
                   <a:solidFill>
                     <a:srgbClr val="000000"/>
                   </a:solidFill>
@@ -5953,7 +5953,7 @@
             </a:ln>
             <a:extLst>
               <a:ext uri="{91240B29-F687-4f45-9708-019B960494DF}">
-                <a14:hiddenLine xmlns:a14="http://schemas.microsoft.com/office/drawing/2010/main" xmlns="" w="9525">
+                <a14:hiddenLine xmlns="" xmlns:a14="http://schemas.microsoft.com/office/drawing/2010/main" w="9525">
                   <a:solidFill>
                     <a:srgbClr val="000000"/>
                   </a:solidFill>
@@ -6043,7 +6043,7 @@
             </a:ln>
             <a:extLst>
               <a:ext uri="{91240B29-F687-4f45-9708-019B960494DF}">
-                <a14:hiddenLine xmlns:a14="http://schemas.microsoft.com/office/drawing/2010/main" xmlns="" w="9525">
+                <a14:hiddenLine xmlns="" xmlns:a14="http://schemas.microsoft.com/office/drawing/2010/main" w="9525">
                   <a:solidFill>
                     <a:srgbClr val="000000"/>
                   </a:solidFill>
@@ -6099,7 +6099,7 @@
             </a:ln>
             <a:extLst>
               <a:ext uri="{91240B29-F687-4f45-9708-019B960494DF}">
-                <a14:hiddenLine xmlns:a14="http://schemas.microsoft.com/office/drawing/2010/main" xmlns="" w="9525">
+                <a14:hiddenLine xmlns="" xmlns:a14="http://schemas.microsoft.com/office/drawing/2010/main" w="9525">
                   <a:solidFill>
                     <a:srgbClr val="000000"/>
                   </a:solidFill>
@@ -6189,7 +6189,7 @@
             </a:ln>
             <a:extLst>
               <a:ext uri="{91240B29-F687-4f45-9708-019B960494DF}">
-                <a14:hiddenLine xmlns:a14="http://schemas.microsoft.com/office/drawing/2010/main" xmlns="" w="9525">
+                <a14:hiddenLine xmlns="" xmlns:a14="http://schemas.microsoft.com/office/drawing/2010/main" w="9525">
                   <a:solidFill>
                     <a:srgbClr val="000000"/>
                   </a:solidFill>
@@ -6257,7 +6257,7 @@
             </a:ln>
             <a:extLst>
               <a:ext uri="{91240B29-F687-4f45-9708-019B960494DF}">
-                <a14:hiddenLine xmlns:a14="http://schemas.microsoft.com/office/drawing/2010/main" xmlns="" w="9525">
+                <a14:hiddenLine xmlns="" xmlns:a14="http://schemas.microsoft.com/office/drawing/2010/main" w="9525">
                   <a:solidFill>
                     <a:srgbClr val="000000"/>
                   </a:solidFill>
@@ -6347,7 +6347,7 @@
             </a:ln>
             <a:extLst>
               <a:ext uri="{91240B29-F687-4f45-9708-019B960494DF}">
-                <a14:hiddenLine xmlns:a14="http://schemas.microsoft.com/office/drawing/2010/main" xmlns="" w="9525">
+                <a14:hiddenLine xmlns="" xmlns:a14="http://schemas.microsoft.com/office/drawing/2010/main" w="9525">
                   <a:solidFill>
                     <a:srgbClr val="000000"/>
                   </a:solidFill>
@@ -6415,7 +6415,7 @@
             </a:ln>
             <a:extLst>
               <a:ext uri="{91240B29-F687-4f45-9708-019B960494DF}">
-                <a14:hiddenLine xmlns:a14="http://schemas.microsoft.com/office/drawing/2010/main" xmlns="" w="9525">
+                <a14:hiddenLine xmlns="" xmlns:a14="http://schemas.microsoft.com/office/drawing/2010/main" w="9525">
                   <a:solidFill>
                     <a:srgbClr val="000000"/>
                   </a:solidFill>
@@ -6505,7 +6505,7 @@
             </a:ln>
             <a:extLst>
               <a:ext uri="{91240B29-F687-4f45-9708-019B960494DF}">
-                <a14:hiddenLine xmlns:a14="http://schemas.microsoft.com/office/drawing/2010/main" xmlns="" w="9525">
+                <a14:hiddenLine xmlns="" xmlns:a14="http://schemas.microsoft.com/office/drawing/2010/main" w="9525">
                   <a:solidFill>
                     <a:srgbClr val="000000"/>
                   </a:solidFill>
@@ -6539,7 +6539,7 @@
             </a:ln>
             <a:extLst>
               <a:ext uri="{91240B29-F687-4f45-9708-019B960494DF}">
-                <a14:hiddenLine xmlns:a14="http://schemas.microsoft.com/office/drawing/2010/main" xmlns="" w="9525">
+                <a14:hiddenLine xmlns="" xmlns:a14="http://schemas.microsoft.com/office/drawing/2010/main" w="9525">
                   <a:solidFill>
                     <a:srgbClr val="000000"/>
                   </a:solidFill>
@@ -6629,7 +6629,7 @@
             </a:ln>
             <a:extLst>
               <a:ext uri="{91240B29-F687-4f45-9708-019B960494DF}">
-                <a14:hiddenLine xmlns:a14="http://schemas.microsoft.com/office/drawing/2010/main" xmlns="" w="9525">
+                <a14:hiddenLine xmlns="" xmlns:a14="http://schemas.microsoft.com/office/drawing/2010/main" w="9525">
                   <a:solidFill>
                     <a:srgbClr val="000000"/>
                   </a:solidFill>
@@ -6691,7 +6691,7 @@
             </a:ln>
             <a:extLst>
               <a:ext uri="{91240B29-F687-4f45-9708-019B960494DF}">
-                <a14:hiddenLine xmlns:a14="http://schemas.microsoft.com/office/drawing/2010/main" xmlns="" w="9525">
+                <a14:hiddenLine xmlns="" xmlns:a14="http://schemas.microsoft.com/office/drawing/2010/main" w="9525">
                   <a:solidFill>
                     <a:srgbClr val="000000"/>
                   </a:solidFill>
@@ -6753,7 +6753,7 @@
             </a:ln>
             <a:extLst>
               <a:ext uri="{91240B29-F687-4f45-9708-019B960494DF}">
-                <a14:hiddenLine xmlns:a14="http://schemas.microsoft.com/office/drawing/2010/main" xmlns="" w="9525">
+                <a14:hiddenLine xmlns="" xmlns:a14="http://schemas.microsoft.com/office/drawing/2010/main" w="9525">
                   <a:solidFill>
                     <a:srgbClr val="000000"/>
                   </a:solidFill>
@@ -6843,7 +6843,7 @@
             </a:ln>
             <a:extLst>
               <a:ext uri="{91240B29-F687-4f45-9708-019B960494DF}">
-                <a14:hiddenLine xmlns:a14="http://schemas.microsoft.com/office/drawing/2010/main" xmlns="" w="9525">
+                <a14:hiddenLine xmlns="" xmlns:a14="http://schemas.microsoft.com/office/drawing/2010/main" w="9525">
                   <a:solidFill>
                     <a:srgbClr val="000000"/>
                   </a:solidFill>
@@ -6911,7 +6911,7 @@
             </a:ln>
             <a:extLst>
               <a:ext uri="{91240B29-F687-4f45-9708-019B960494DF}">
-                <a14:hiddenLine xmlns:a14="http://schemas.microsoft.com/office/drawing/2010/main" xmlns="" w="9525">
+                <a14:hiddenLine xmlns="" xmlns:a14="http://schemas.microsoft.com/office/drawing/2010/main" w="9525">
                   <a:solidFill>
                     <a:srgbClr val="000000"/>
                   </a:solidFill>
@@ -6973,7 +6973,7 @@
             </a:ln>
             <a:extLst>
               <a:ext uri="{91240B29-F687-4f45-9708-019B960494DF}">
-                <a14:hiddenLine xmlns:a14="http://schemas.microsoft.com/office/drawing/2010/main" xmlns="" w="9525">
+                <a14:hiddenLine xmlns="" xmlns:a14="http://schemas.microsoft.com/office/drawing/2010/main" w="9525">
                   <a:solidFill>
                     <a:srgbClr val="000000"/>
                   </a:solidFill>
@@ -7063,7 +7063,7 @@
             </a:ln>
             <a:extLst>
               <a:ext uri="{91240B29-F687-4f45-9708-019B960494DF}">
-                <a14:hiddenLine xmlns:a14="http://schemas.microsoft.com/office/drawing/2010/main" xmlns="" w="9525">
+                <a14:hiddenLine xmlns="" xmlns:a14="http://schemas.microsoft.com/office/drawing/2010/main" w="9525">
                   <a:solidFill>
                     <a:srgbClr val="000000"/>
                   </a:solidFill>
@@ -7125,7 +7125,7 @@
             </a:ln>
             <a:extLst>
               <a:ext uri="{91240B29-F687-4f45-9708-019B960494DF}">
-                <a14:hiddenLine xmlns:a14="http://schemas.microsoft.com/office/drawing/2010/main" xmlns="" w="9525">
+                <a14:hiddenLine xmlns="" xmlns:a14="http://schemas.microsoft.com/office/drawing/2010/main" w="9525">
                   <a:solidFill>
                     <a:srgbClr val="000000"/>
                   </a:solidFill>
@@ -7215,7 +7215,7 @@
             </a:ln>
             <a:extLst>
               <a:ext uri="{91240B29-F687-4f45-9708-019B960494DF}">
-                <a14:hiddenLine xmlns:a14="http://schemas.microsoft.com/office/drawing/2010/main" xmlns="" w="9525">
+                <a14:hiddenLine xmlns="" xmlns:a14="http://schemas.microsoft.com/office/drawing/2010/main" w="9525">
                   <a:solidFill>
                     <a:srgbClr val="000000"/>
                   </a:solidFill>
@@ -7277,7 +7277,7 @@
             </a:ln>
             <a:extLst>
               <a:ext uri="{91240B29-F687-4f45-9708-019B960494DF}">
-                <a14:hiddenLine xmlns:a14="http://schemas.microsoft.com/office/drawing/2010/main" xmlns="" w="9525">
+                <a14:hiddenLine xmlns="" xmlns:a14="http://schemas.microsoft.com/office/drawing/2010/main" w="9525">
                   <a:solidFill>
                     <a:srgbClr val="000000"/>
                   </a:solidFill>
@@ -7367,7 +7367,7 @@
             </a:ln>
             <a:extLst>
               <a:ext uri="{91240B29-F687-4f45-9708-019B960494DF}">
-                <a14:hiddenLine xmlns:a14="http://schemas.microsoft.com/office/drawing/2010/main" xmlns="" w="9525">
+                <a14:hiddenLine xmlns="" xmlns:a14="http://schemas.microsoft.com/office/drawing/2010/main" w="9525">
                   <a:solidFill>
                     <a:srgbClr val="000000"/>
                   </a:solidFill>
@@ -7401,7 +7401,7 @@
             </a:ln>
             <a:extLst>
               <a:ext uri="{91240B29-F687-4f45-9708-019B960494DF}">
-                <a14:hiddenLine xmlns:a14="http://schemas.microsoft.com/office/drawing/2010/main" xmlns="" w="9525">
+                <a14:hiddenLine xmlns="" xmlns:a14="http://schemas.microsoft.com/office/drawing/2010/main" w="9525">
                   <a:solidFill>
                     <a:srgbClr val="000000"/>
                   </a:solidFill>
@@ -7466,7 +7466,7 @@
             </a:ln>
             <a:extLst>
               <a:ext uri="{91240B29-F687-4f45-9708-019B960494DF}">
-                <a14:hiddenLine xmlns:a14="http://schemas.microsoft.com/office/drawing/2010/main" xmlns="" w="9525">
+                <a14:hiddenLine xmlns="" xmlns:a14="http://schemas.microsoft.com/office/drawing/2010/main" w="9525">
                   <a:solidFill>
                     <a:srgbClr val="000000"/>
                   </a:solidFill>
@@ -7556,7 +7556,7 @@
             </a:ln>
             <a:extLst>
               <a:ext uri="{91240B29-F687-4f45-9708-019B960494DF}">
-                <a14:hiddenLine xmlns:a14="http://schemas.microsoft.com/office/drawing/2010/main" xmlns="" w="9525">
+                <a14:hiddenLine xmlns="" xmlns:a14="http://schemas.microsoft.com/office/drawing/2010/main" w="9525">
                   <a:solidFill>
                     <a:srgbClr val="000000"/>
                   </a:solidFill>
@@ -7618,7 +7618,7 @@
             </a:ln>
             <a:extLst>
               <a:ext uri="{91240B29-F687-4f45-9708-019B960494DF}">
-                <a14:hiddenLine xmlns:a14="http://schemas.microsoft.com/office/drawing/2010/main" xmlns="" w="9525">
+                <a14:hiddenLine xmlns="" xmlns:a14="http://schemas.microsoft.com/office/drawing/2010/main" w="9525">
                   <a:solidFill>
                     <a:srgbClr val="000000"/>
                   </a:solidFill>
@@ -7708,7 +7708,7 @@
             </a:ln>
             <a:extLst>
               <a:ext uri="{91240B29-F687-4f45-9708-019B960494DF}">
-                <a14:hiddenLine xmlns:a14="http://schemas.microsoft.com/office/drawing/2010/main" xmlns="" w="9525">
+                <a14:hiddenLine xmlns="" xmlns:a14="http://schemas.microsoft.com/office/drawing/2010/main" w="9525">
                   <a:solidFill>
                     <a:srgbClr val="000000"/>
                   </a:solidFill>
@@ -7798,7 +7798,7 @@
             </a:ln>
             <a:extLst>
               <a:ext uri="{91240B29-F687-4f45-9708-019B960494DF}">
-                <a14:hiddenLine xmlns:a14="http://schemas.microsoft.com/office/drawing/2010/main" xmlns="" w="9525">
+                <a14:hiddenLine xmlns="" xmlns:a14="http://schemas.microsoft.com/office/drawing/2010/main" w="9525">
                   <a:solidFill>
                     <a:srgbClr val="000000"/>
                   </a:solidFill>
@@ -7863,7 +7863,7 @@
             </a:ln>
             <a:extLst>
               <a:ext uri="{91240B29-F687-4f45-9708-019B960494DF}">
-                <a14:hiddenLine xmlns:a14="http://schemas.microsoft.com/office/drawing/2010/main" xmlns="" w="9525">
+                <a14:hiddenLine xmlns="" xmlns:a14="http://schemas.microsoft.com/office/drawing/2010/main" w="9525">
                   <a:solidFill>
                     <a:srgbClr val="000000"/>
                   </a:solidFill>
@@ -7925,7 +7925,7 @@
             </a:ln>
             <a:extLst>
               <a:ext uri="{91240B29-F687-4f45-9708-019B960494DF}">
-                <a14:hiddenLine xmlns:a14="http://schemas.microsoft.com/office/drawing/2010/main" xmlns="" w="9525">
+                <a14:hiddenLine xmlns="" xmlns:a14="http://schemas.microsoft.com/office/drawing/2010/main" w="9525">
                   <a:solidFill>
                     <a:srgbClr val="000000"/>
                   </a:solidFill>
@@ -8015,7 +8015,7 @@
             </a:ln>
             <a:extLst>
               <a:ext uri="{91240B29-F687-4f45-9708-019B960494DF}">
-                <a14:hiddenLine xmlns:a14="http://schemas.microsoft.com/office/drawing/2010/main" xmlns="" w="9525">
+                <a14:hiddenLine xmlns="" xmlns:a14="http://schemas.microsoft.com/office/drawing/2010/main" w="9525">
                   <a:solidFill>
                     <a:srgbClr val="000000"/>
                   </a:solidFill>
@@ -8105,7 +8105,7 @@
             </a:ln>
             <a:extLst>
               <a:ext uri="{91240B29-F687-4f45-9708-019B960494DF}">
-                <a14:hiddenLine xmlns:a14="http://schemas.microsoft.com/office/drawing/2010/main" xmlns="" w="9525">
+                <a14:hiddenLine xmlns="" xmlns:a14="http://schemas.microsoft.com/office/drawing/2010/main" w="9525">
                   <a:solidFill>
                     <a:srgbClr val="000000"/>
                   </a:solidFill>
@@ -8167,7 +8167,7 @@
             </a:ln>
             <a:extLst>
               <a:ext uri="{91240B29-F687-4f45-9708-019B960494DF}">
-                <a14:hiddenLine xmlns:a14="http://schemas.microsoft.com/office/drawing/2010/main" xmlns="" w="9525">
+                <a14:hiddenLine xmlns="" xmlns:a14="http://schemas.microsoft.com/office/drawing/2010/main" w="9525">
                   <a:solidFill>
                     <a:srgbClr val="000000"/>
                   </a:solidFill>
@@ -8287,7 +8287,7 @@
             </a:ln>
             <a:extLst>
               <a:ext uri="{91240B29-F687-4f45-9708-019B960494DF}">
-                <a14:hiddenLine xmlns:a14="http://schemas.microsoft.com/office/drawing/2010/main" xmlns="" w="9525">
+                <a14:hiddenLine xmlns="" xmlns:a14="http://schemas.microsoft.com/office/drawing/2010/main" w="9525">
                   <a:solidFill>
                     <a:srgbClr val="000000"/>
                   </a:solidFill>
@@ -8355,7 +8355,7 @@
             </a:ln>
             <a:extLst>
               <a:ext uri="{91240B29-F687-4f45-9708-019B960494DF}">
-                <a14:hiddenLine xmlns:a14="http://schemas.microsoft.com/office/drawing/2010/main" xmlns="" w="9525">
+                <a14:hiddenLine xmlns="" xmlns:a14="http://schemas.microsoft.com/office/drawing/2010/main" w="9525">
                   <a:solidFill>
                     <a:srgbClr val="000000"/>
                   </a:solidFill>
@@ -8445,7 +8445,7 @@
             </a:ln>
             <a:extLst>
               <a:ext uri="{91240B29-F687-4f45-9708-019B960494DF}">
-                <a14:hiddenLine xmlns:a14="http://schemas.microsoft.com/office/drawing/2010/main" xmlns="" w="9525">
+                <a14:hiddenLine xmlns="" xmlns:a14="http://schemas.microsoft.com/office/drawing/2010/main" w="9525">
                   <a:solidFill>
                     <a:srgbClr val="000000"/>
                   </a:solidFill>
@@ -13259,7 +13259,7 @@
           <a:noFill/>
           <a:extLst>
             <a:ext uri="{909E8E84-426E-40dd-AFC4-6F175D3DCCD1}">
-              <a14:hiddenFill xmlns:a14="http://schemas.microsoft.com/office/drawing/2010/main" xmlns="">
+              <a14:hiddenFill xmlns="" xmlns:a14="http://schemas.microsoft.com/office/drawing/2010/main">
                 <a:solidFill>
                   <a:srgbClr val="FFFFFF"/>
                 </a:solidFill>
@@ -13333,7 +13333,7 @@
               </a:ln>
               <a:extLst>
                 <a:ext uri="{91240B29-F687-4f45-9708-019B960494DF}">
-                  <a14:hiddenLine xmlns:a14="http://schemas.microsoft.com/office/drawing/2010/main" xmlns="" w="9525">
+                  <a14:hiddenLine xmlns="" xmlns:a14="http://schemas.microsoft.com/office/drawing/2010/main" w="9525">
                     <a:solidFill>
                       <a:srgbClr val="000000"/>
                     </a:solidFill>
@@ -13423,7 +13423,7 @@
               </a:ln>
               <a:extLst>
                 <a:ext uri="{91240B29-F687-4f45-9708-019B960494DF}">
-                  <a14:hiddenLine xmlns:a14="http://schemas.microsoft.com/office/drawing/2010/main" xmlns="" w="9525">
+                  <a14:hiddenLine xmlns="" xmlns:a14="http://schemas.microsoft.com/office/drawing/2010/main" w="9525">
                     <a:solidFill>
                       <a:srgbClr val="000000"/>
                     </a:solidFill>
@@ -13513,7 +13513,7 @@
               </a:ln>
               <a:extLst>
                 <a:ext uri="{91240B29-F687-4f45-9708-019B960494DF}">
-                  <a14:hiddenLine xmlns:a14="http://schemas.microsoft.com/office/drawing/2010/main" xmlns="" w="9525">
+                  <a14:hiddenLine xmlns="" xmlns:a14="http://schemas.microsoft.com/office/drawing/2010/main" w="9525">
                     <a:solidFill>
                       <a:srgbClr val="000000"/>
                     </a:solidFill>
@@ -13575,7 +13575,7 @@
               </a:ln>
               <a:extLst>
                 <a:ext uri="{91240B29-F687-4f45-9708-019B960494DF}">
-                  <a14:hiddenLine xmlns:a14="http://schemas.microsoft.com/office/drawing/2010/main" xmlns="" w="9525">
+                  <a14:hiddenLine xmlns="" xmlns:a14="http://schemas.microsoft.com/office/drawing/2010/main" w="9525">
                     <a:solidFill>
                       <a:srgbClr val="000000"/>
                     </a:solidFill>
@@ -13665,7 +13665,7 @@
               </a:ln>
               <a:extLst>
                 <a:ext uri="{91240B29-F687-4f45-9708-019B960494DF}">
-                  <a14:hiddenLine xmlns:a14="http://schemas.microsoft.com/office/drawing/2010/main" xmlns="" w="9525">
+                  <a14:hiddenLine xmlns="" xmlns:a14="http://schemas.microsoft.com/office/drawing/2010/main" w="9525">
                     <a:solidFill>
                       <a:srgbClr val="000000"/>
                     </a:solidFill>
@@ -13727,7 +13727,7 @@
               </a:ln>
               <a:extLst>
                 <a:ext uri="{91240B29-F687-4f45-9708-019B960494DF}">
-                  <a14:hiddenLine xmlns:a14="http://schemas.microsoft.com/office/drawing/2010/main" xmlns="" w="9525">
+                  <a14:hiddenLine xmlns="" xmlns:a14="http://schemas.microsoft.com/office/drawing/2010/main" w="9525">
                     <a:solidFill>
                       <a:srgbClr val="000000"/>
                     </a:solidFill>
@@ -13789,7 +13789,7 @@
               </a:ln>
               <a:extLst>
                 <a:ext uri="{91240B29-F687-4f45-9708-019B960494DF}">
-                  <a14:hiddenLine xmlns:a14="http://schemas.microsoft.com/office/drawing/2010/main" xmlns="" w="9525">
+                  <a14:hiddenLine xmlns="" xmlns:a14="http://schemas.microsoft.com/office/drawing/2010/main" w="9525">
                     <a:solidFill>
                       <a:srgbClr val="000000"/>
                     </a:solidFill>
@@ -13879,7 +13879,7 @@
               </a:ln>
               <a:extLst>
                 <a:ext uri="{91240B29-F687-4f45-9708-019B960494DF}">
-                  <a14:hiddenLine xmlns:a14="http://schemas.microsoft.com/office/drawing/2010/main" xmlns="" w="9525">
+                  <a14:hiddenLine xmlns="" xmlns:a14="http://schemas.microsoft.com/office/drawing/2010/main" w="9525">
                     <a:solidFill>
                       <a:srgbClr val="000000"/>
                     </a:solidFill>
@@ -13969,7 +13969,7 @@
               </a:ln>
               <a:extLst>
                 <a:ext uri="{91240B29-F687-4f45-9708-019B960494DF}">
-                  <a14:hiddenLine xmlns:a14="http://schemas.microsoft.com/office/drawing/2010/main" xmlns="" w="9525">
+                  <a14:hiddenLine xmlns="" xmlns:a14="http://schemas.microsoft.com/office/drawing/2010/main" w="9525">
                     <a:solidFill>
                       <a:srgbClr val="000000"/>
                     </a:solidFill>
@@ -14031,7 +14031,7 @@
               </a:ln>
               <a:extLst>
                 <a:ext uri="{91240B29-F687-4f45-9708-019B960494DF}">
-                  <a14:hiddenLine xmlns:a14="http://schemas.microsoft.com/office/drawing/2010/main" xmlns="" w="9525">
+                  <a14:hiddenLine xmlns="" xmlns:a14="http://schemas.microsoft.com/office/drawing/2010/main" w="9525">
                     <a:solidFill>
                       <a:srgbClr val="000000"/>
                     </a:solidFill>
@@ -14141,7 +14141,7 @@
               </a:ln>
               <a:extLst>
                 <a:ext uri="{91240B29-F687-4f45-9708-019B960494DF}">
-                  <a14:hiddenLine xmlns:a14="http://schemas.microsoft.com/office/drawing/2010/main" xmlns="" w="9525">
+                  <a14:hiddenLine xmlns="" xmlns:a14="http://schemas.microsoft.com/office/drawing/2010/main" w="9525">
                     <a:solidFill>
                       <a:srgbClr val="000000"/>
                     </a:solidFill>
@@ -14225,7 +14225,7 @@
               </a:ln>
               <a:extLst>
                 <a:ext uri="{91240B29-F687-4f45-9708-019B960494DF}">
-                  <a14:hiddenLine xmlns:a14="http://schemas.microsoft.com/office/drawing/2010/main" xmlns="" w="9525">
+                  <a14:hiddenLine xmlns="" xmlns:a14="http://schemas.microsoft.com/office/drawing/2010/main" w="9525">
                     <a:solidFill>
                       <a:srgbClr val="000000"/>
                     </a:solidFill>
@@ -14287,7 +14287,7 @@
               </a:ln>
               <a:extLst>
                 <a:ext uri="{91240B29-F687-4f45-9708-019B960494DF}">
-                  <a14:hiddenLine xmlns:a14="http://schemas.microsoft.com/office/drawing/2010/main" xmlns="" w="9525">
+                  <a14:hiddenLine xmlns="" xmlns:a14="http://schemas.microsoft.com/office/drawing/2010/main" w="9525">
                     <a:solidFill>
                       <a:srgbClr val="000000"/>
                     </a:solidFill>
@@ -14349,7 +14349,7 @@
               </a:ln>
               <a:extLst>
                 <a:ext uri="{91240B29-F687-4f45-9708-019B960494DF}">
-                  <a14:hiddenLine xmlns:a14="http://schemas.microsoft.com/office/drawing/2010/main" xmlns="" w="9525">
+                  <a14:hiddenLine xmlns="" xmlns:a14="http://schemas.microsoft.com/office/drawing/2010/main" w="9525">
                     <a:solidFill>
                       <a:srgbClr val="000000"/>
                     </a:solidFill>
@@ -14439,7 +14439,7 @@
               </a:ln>
               <a:extLst>
                 <a:ext uri="{91240B29-F687-4f45-9708-019B960494DF}">
-                  <a14:hiddenLine xmlns:a14="http://schemas.microsoft.com/office/drawing/2010/main" xmlns="" w="9525">
+                  <a14:hiddenLine xmlns="" xmlns:a14="http://schemas.microsoft.com/office/drawing/2010/main" w="9525">
                     <a:solidFill>
                       <a:srgbClr val="000000"/>
                     </a:solidFill>
@@ -14473,7 +14473,7 @@
               </a:ln>
               <a:extLst>
                 <a:ext uri="{91240B29-F687-4f45-9708-019B960494DF}">
-                  <a14:hiddenLine xmlns:a14="http://schemas.microsoft.com/office/drawing/2010/main" xmlns="" w="9525">
+                  <a14:hiddenLine xmlns="" xmlns:a14="http://schemas.microsoft.com/office/drawing/2010/main" w="9525">
                     <a:solidFill>
                       <a:srgbClr val="000000"/>
                     </a:solidFill>
@@ -14538,7 +14538,7 @@
               </a:ln>
               <a:extLst>
                 <a:ext uri="{91240B29-F687-4f45-9708-019B960494DF}">
-                  <a14:hiddenLine xmlns:a14="http://schemas.microsoft.com/office/drawing/2010/main" xmlns="" w="9525">
+                  <a14:hiddenLine xmlns="" xmlns:a14="http://schemas.microsoft.com/office/drawing/2010/main" w="9525">
                     <a:solidFill>
                       <a:srgbClr val="000000"/>
                     </a:solidFill>
@@ -14628,7 +14628,7 @@
               </a:ln>
               <a:extLst>
                 <a:ext uri="{91240B29-F687-4f45-9708-019B960494DF}">
-                  <a14:hiddenLine xmlns:a14="http://schemas.microsoft.com/office/drawing/2010/main" xmlns="" w="9525">
+                  <a14:hiddenLine xmlns="" xmlns:a14="http://schemas.microsoft.com/office/drawing/2010/main" w="9525">
                     <a:solidFill>
                       <a:srgbClr val="000000"/>
                     </a:solidFill>
@@ -14690,7 +14690,7 @@
               </a:ln>
               <a:extLst>
                 <a:ext uri="{91240B29-F687-4f45-9708-019B960494DF}">
-                  <a14:hiddenLine xmlns:a14="http://schemas.microsoft.com/office/drawing/2010/main" xmlns="" w="9525">
+                  <a14:hiddenLine xmlns="" xmlns:a14="http://schemas.microsoft.com/office/drawing/2010/main" w="9525">
                     <a:solidFill>
                       <a:srgbClr val="000000"/>
                     </a:solidFill>
@@ -14780,7 +14780,7 @@
               </a:ln>
               <a:extLst>
                 <a:ext uri="{91240B29-F687-4f45-9708-019B960494DF}">
-                  <a14:hiddenLine xmlns:a14="http://schemas.microsoft.com/office/drawing/2010/main" xmlns="" w="9525">
+                  <a14:hiddenLine xmlns="" xmlns:a14="http://schemas.microsoft.com/office/drawing/2010/main" w="9525">
                     <a:solidFill>
                       <a:srgbClr val="000000"/>
                     </a:solidFill>
@@ -14845,7 +14845,7 @@
               </a:ln>
               <a:extLst>
                 <a:ext uri="{91240B29-F687-4f45-9708-019B960494DF}">
-                  <a14:hiddenLine xmlns:a14="http://schemas.microsoft.com/office/drawing/2010/main" xmlns="" w="9525">
+                  <a14:hiddenLine xmlns="" xmlns:a14="http://schemas.microsoft.com/office/drawing/2010/main" w="9525">
                     <a:solidFill>
                       <a:srgbClr val="000000"/>
                     </a:solidFill>
@@ -14907,7 +14907,7 @@
               </a:ln>
               <a:extLst>
                 <a:ext uri="{91240B29-F687-4f45-9708-019B960494DF}">
-                  <a14:hiddenLine xmlns:a14="http://schemas.microsoft.com/office/drawing/2010/main" xmlns="" w="9525">
+                  <a14:hiddenLine xmlns="" xmlns:a14="http://schemas.microsoft.com/office/drawing/2010/main" w="9525">
                     <a:solidFill>
                       <a:srgbClr val="000000"/>
                     </a:solidFill>
@@ -14997,7 +14997,7 @@
               </a:ln>
               <a:extLst>
                 <a:ext uri="{91240B29-F687-4f45-9708-019B960494DF}">
-                  <a14:hiddenLine xmlns:a14="http://schemas.microsoft.com/office/drawing/2010/main" xmlns="" w="9525">
+                  <a14:hiddenLine xmlns="" xmlns:a14="http://schemas.microsoft.com/office/drawing/2010/main" w="9525">
                     <a:solidFill>
                       <a:srgbClr val="000000"/>
                     </a:solidFill>
@@ -15087,7 +15087,7 @@
               </a:ln>
               <a:extLst>
                 <a:ext uri="{91240B29-F687-4f45-9708-019B960494DF}">
-                  <a14:hiddenLine xmlns:a14="http://schemas.microsoft.com/office/drawing/2010/main" xmlns="" w="9525">
+                  <a14:hiddenLine xmlns="" xmlns:a14="http://schemas.microsoft.com/office/drawing/2010/main" w="9525">
                     <a:solidFill>
                       <a:srgbClr val="000000"/>
                     </a:solidFill>
@@ -15152,7 +15152,7 @@
               </a:ln>
               <a:extLst>
                 <a:ext uri="{91240B29-F687-4f45-9708-019B960494DF}">
-                  <a14:hiddenLine xmlns:a14="http://schemas.microsoft.com/office/drawing/2010/main" xmlns="" w="9525">
+                  <a14:hiddenLine xmlns="" xmlns:a14="http://schemas.microsoft.com/office/drawing/2010/main" w="9525">
                     <a:solidFill>
                       <a:srgbClr val="000000"/>
                     </a:solidFill>
@@ -15272,7 +15272,7 @@
               </a:ln>
               <a:extLst>
                 <a:ext uri="{91240B29-F687-4f45-9708-019B960494DF}">
-                  <a14:hiddenLine xmlns:a14="http://schemas.microsoft.com/office/drawing/2010/main" xmlns="" w="9525">
+                  <a14:hiddenLine xmlns="" xmlns:a14="http://schemas.microsoft.com/office/drawing/2010/main" w="9525">
                     <a:solidFill>
                       <a:srgbClr val="000000"/>
                     </a:solidFill>
@@ -15353,7 +15353,7 @@
               </a:ln>
               <a:extLst>
                 <a:ext uri="{91240B29-F687-4f45-9708-019B960494DF}">
-                  <a14:hiddenLine xmlns:a14="http://schemas.microsoft.com/office/drawing/2010/main" xmlns="" w="9525">
+                  <a14:hiddenLine xmlns="" xmlns:a14="http://schemas.microsoft.com/office/drawing/2010/main" w="9525">
                     <a:solidFill>
                       <a:srgbClr val="000000"/>
                     </a:solidFill>
@@ -15468,7 +15468,7 @@
               </a:ln>
               <a:extLst>
                 <a:ext uri="{91240B29-F687-4f45-9708-019B960494DF}">
-                  <a14:hiddenLine xmlns:a14="http://schemas.microsoft.com/office/drawing/2010/main" xmlns="" w="9525">
+                  <a14:hiddenLine xmlns="" xmlns:a14="http://schemas.microsoft.com/office/drawing/2010/main" w="9525">
                     <a:solidFill>
                       <a:srgbClr val="000000"/>
                     </a:solidFill>
@@ -15558,7 +15558,7 @@
               </a:ln>
               <a:extLst>
                 <a:ext uri="{91240B29-F687-4f45-9708-019B960494DF}">
-                  <a14:hiddenLine xmlns:a14="http://schemas.microsoft.com/office/drawing/2010/main" xmlns="" w="9525">
+                  <a14:hiddenLine xmlns="" xmlns:a14="http://schemas.microsoft.com/office/drawing/2010/main" w="9525">
                     <a:solidFill>
                       <a:srgbClr val="000000"/>
                     </a:solidFill>
@@ -15623,7 +15623,7 @@
               </a:ln>
               <a:extLst>
                 <a:ext uri="{91240B29-F687-4f45-9708-019B960494DF}">
-                  <a14:hiddenLine xmlns:a14="http://schemas.microsoft.com/office/drawing/2010/main" xmlns="" w="9525">
+                  <a14:hiddenLine xmlns="" xmlns:a14="http://schemas.microsoft.com/office/drawing/2010/main" w="9525">
                     <a:solidFill>
                       <a:srgbClr val="000000"/>
                     </a:solidFill>
@@ -15713,7 +15713,7 @@
               </a:ln>
               <a:extLst>
                 <a:ext uri="{91240B29-F687-4f45-9708-019B960494DF}">
-                  <a14:hiddenLine xmlns:a14="http://schemas.microsoft.com/office/drawing/2010/main" xmlns="" w="9525">
+                  <a14:hiddenLine xmlns="" xmlns:a14="http://schemas.microsoft.com/office/drawing/2010/main" w="9525">
                     <a:solidFill>
                       <a:srgbClr val="000000"/>
                     </a:solidFill>
@@ -15781,7 +15781,7 @@
               </a:ln>
               <a:extLst>
                 <a:ext uri="{91240B29-F687-4f45-9708-019B960494DF}">
-                  <a14:hiddenLine xmlns:a14="http://schemas.microsoft.com/office/drawing/2010/main" xmlns="" w="9525">
+                  <a14:hiddenLine xmlns="" xmlns:a14="http://schemas.microsoft.com/office/drawing/2010/main" w="9525">
                     <a:solidFill>
                       <a:srgbClr val="000000"/>
                     </a:solidFill>
@@ -15871,7 +15871,7 @@
               </a:ln>
               <a:extLst>
                 <a:ext uri="{91240B29-F687-4f45-9708-019B960494DF}">
-                  <a14:hiddenLine xmlns:a14="http://schemas.microsoft.com/office/drawing/2010/main" xmlns="" w="9525">
+                  <a14:hiddenLine xmlns="" xmlns:a14="http://schemas.microsoft.com/office/drawing/2010/main" w="9525">
                     <a:solidFill>
                       <a:srgbClr val="000000"/>
                     </a:solidFill>
@@ -15939,7 +15939,7 @@
               </a:ln>
               <a:extLst>
                 <a:ext uri="{91240B29-F687-4f45-9708-019B960494DF}">
-                  <a14:hiddenLine xmlns:a14="http://schemas.microsoft.com/office/drawing/2010/main" xmlns="" w="9525">
+                  <a14:hiddenLine xmlns="" xmlns:a14="http://schemas.microsoft.com/office/drawing/2010/main" w="9525">
                     <a:solidFill>
                       <a:srgbClr val="000000"/>
                     </a:solidFill>
@@ -16029,7 +16029,7 @@
               </a:ln>
               <a:extLst>
                 <a:ext uri="{91240B29-F687-4f45-9708-019B960494DF}">
-                  <a14:hiddenLine xmlns:a14="http://schemas.microsoft.com/office/drawing/2010/main" xmlns="" w="9525">
+                  <a14:hiddenLine xmlns="" xmlns:a14="http://schemas.microsoft.com/office/drawing/2010/main" w="9525">
                     <a:solidFill>
                       <a:srgbClr val="000000"/>
                     </a:solidFill>
@@ -16063,7 +16063,7 @@
               </a:ln>
               <a:extLst>
                 <a:ext uri="{91240B29-F687-4f45-9708-019B960494DF}">
-                  <a14:hiddenLine xmlns:a14="http://schemas.microsoft.com/office/drawing/2010/main" xmlns="" w="9525">
+                  <a14:hiddenLine xmlns="" xmlns:a14="http://schemas.microsoft.com/office/drawing/2010/main" w="9525">
                     <a:solidFill>
                       <a:srgbClr val="000000"/>
                     </a:solidFill>
@@ -17509,10 +17509,10 @@
       </p:sp>
       <p:pic>
         <p:nvPicPr>
-          <p:cNvPr id="8" name="Inhaltsplatzhalter 7" descr="Ein Bild, das Screenshot, Parkplatz, draußen, Gebäude enthält.&#10;&#10;Automatisch generierte Beschreibung">
+          <p:cNvPr id="6" name="Inhaltsplatzhalter 5">
             <a:extLst>
               <a:ext uri="{FF2B5EF4-FFF2-40B4-BE49-F238E27FC236}">
-                <a16:creationId xmlns:a16="http://schemas.microsoft.com/office/drawing/2014/main" id="{A79286BE-CCC1-4772-92F6-C72F88009902}"/>
+                <a16:creationId xmlns:a16="http://schemas.microsoft.com/office/drawing/2014/main" id="{A8E7AE40-D02C-4986-9C5B-4ED698120DE6}"/>
               </a:ext>
             </a:extLst>
           </p:cNvPr>
@@ -17528,6 +17528,9 @@
             <a:extLst>
               <a:ext uri="{28A0092B-C50C-407E-A947-70E740481C1C}">
                 <a14:useLocalDpi xmlns:a14="http://schemas.microsoft.com/office/drawing/2010/main" val="0"/>
+              </a:ext>
+              <a:ext uri="{96DAC541-7B7A-43D3-8B79-37D633B846F1}">
+                <asvg:svgBlip xmlns:asvg="http://schemas.microsoft.com/office/drawing/2016/SVG/main" r:embed="rId4"/>
               </a:ext>
             </a:extLst>
           </a:blip>
@@ -17537,8 +17540,8 @@
         </p:blipFill>
         <p:spPr>
           <a:xfrm>
-            <a:off x="3238103" y="2097088"/>
-            <a:ext cx="5712618" cy="3831771"/>
+            <a:off x="1665288" y="2305844"/>
+            <a:ext cx="8858250" cy="3429000"/>
           </a:xfrm>
         </p:spPr>
       </p:pic>

</xml_diff>